<commit_message>
[ADDED] example plot for LFP and raw mircoelectrode recording to visualize RMS
</commit_message>
<xml_diff>
--- a/00_general_info/overview_ma.pptx
+++ b/00_general_info/overview_ma.pptx
@@ -5,7 +5,7 @@
     <p:sldMasterId id="2147483660" r:id="rId1"/>
   </p:sldMasterIdLst>
   <p:notesMasterIdLst>
-    <p:notesMasterId r:id="rId14"/>
+    <p:notesMasterId r:id="rId15"/>
   </p:notesMasterIdLst>
   <p:sldIdLst>
     <p:sldId id="256" r:id="rId2"/>
@@ -14,12 +14,13 @@
     <p:sldId id="300" r:id="rId5"/>
     <p:sldId id="299" r:id="rId6"/>
     <p:sldId id="292" r:id="rId7"/>
-    <p:sldId id="293" r:id="rId8"/>
-    <p:sldId id="294" r:id="rId9"/>
-    <p:sldId id="296" r:id="rId10"/>
-    <p:sldId id="297" r:id="rId11"/>
-    <p:sldId id="301" r:id="rId12"/>
-    <p:sldId id="258" r:id="rId13"/>
+    <p:sldId id="302" r:id="rId8"/>
+    <p:sldId id="293" r:id="rId9"/>
+    <p:sldId id="294" r:id="rId10"/>
+    <p:sldId id="296" r:id="rId11"/>
+    <p:sldId id="297" r:id="rId12"/>
+    <p:sldId id="301" r:id="rId13"/>
+    <p:sldId id="258" r:id="rId14"/>
   </p:sldIdLst>
   <p:sldSz cx="12192000" cy="6858000"/>
   <p:notesSz cx="6858000" cy="9144000"/>
@@ -118,6 +119,11 @@
       </a:defRPr>
     </a:lvl9pPr>
   </p:defaultTextStyle>
+  <p:extLst>
+    <p:ext uri="{EFAFB233-063F-42B5-8137-9DF3F51BA10A}">
+      <p15:sldGuideLst xmlns:p15="http://schemas.microsoft.com/office/powerpoint/2012/main"/>
+    </p:ext>
+  </p:extLst>
 </p:presentation>
 </file>
 
@@ -203,7 +209,7 @@
           <a:p>
             <a:fld id="{4CB5FFAA-362C-4123-A36E-F1E077B731E2}" type="datetimeFigureOut">
               <a:rPr lang="en-US" smtClean="0"/>
-              <a:t>11/18/2021</a:t>
+              <a:t>1/13/2022</a:t>
             </a:fld>
             <a:endParaRPr lang="en-US"/>
           </a:p>
@@ -544,7 +550,7 @@
             <a:fld id="{E4EA47C3-D6D1-45C7-B7EF-A1183D105D1C}" type="slidenum">
               <a:rPr lang="de-DE" smtClean="0"/>
               <a:pPr/>
-              <a:t>7</a:t>
+              <a:t>8</a:t>
             </a:fld>
             <a:endParaRPr lang="de-DE" dirty="0"/>
           </a:p>
@@ -672,7 +678,7 @@
             <a:fld id="{E4EA47C3-D6D1-45C7-B7EF-A1183D105D1C}" type="slidenum">
               <a:rPr lang="de-DE" smtClean="0"/>
               <a:pPr/>
-              <a:t>8</a:t>
+              <a:t>9</a:t>
             </a:fld>
             <a:endParaRPr lang="de-DE" dirty="0"/>
           </a:p>
@@ -1062,7 +1068,7 @@
           <a:p>
             <a:fld id="{7AD69ED6-91EF-4BD2-AAD0-A993D1FE3A71}" type="datetimeFigureOut">
               <a:rPr lang="en-US" smtClean="0"/>
-              <a:t>11/18/2021</a:t>
+              <a:t>1/13/2022</a:t>
             </a:fld>
             <a:endParaRPr lang="en-US"/>
           </a:p>
@@ -1262,7 +1268,7 @@
           <a:p>
             <a:fld id="{7AD69ED6-91EF-4BD2-AAD0-A993D1FE3A71}" type="datetimeFigureOut">
               <a:rPr lang="en-US" smtClean="0"/>
-              <a:t>11/18/2021</a:t>
+              <a:t>1/13/2022</a:t>
             </a:fld>
             <a:endParaRPr lang="en-US"/>
           </a:p>
@@ -1472,7 +1478,7 @@
           <a:p>
             <a:fld id="{7AD69ED6-91EF-4BD2-AAD0-A993D1FE3A71}" type="datetimeFigureOut">
               <a:rPr lang="en-US" smtClean="0"/>
-              <a:t>11/18/2021</a:t>
+              <a:t>1/13/2022</a:t>
             </a:fld>
             <a:endParaRPr lang="en-US"/>
           </a:p>
@@ -1737,7 +1743,7 @@
           <a:p>
             <a:fld id="{7AD69ED6-91EF-4BD2-AAD0-A993D1FE3A71}" type="datetimeFigureOut">
               <a:rPr lang="en-US" smtClean="0"/>
-              <a:t>11/18/2021</a:t>
+              <a:t>1/13/2022</a:t>
             </a:fld>
             <a:endParaRPr lang="en-US"/>
           </a:p>
@@ -2726,7 +2732,7 @@
           <a:p>
             <a:fld id="{7AD69ED6-91EF-4BD2-AAD0-A993D1FE3A71}" type="datetimeFigureOut">
               <a:rPr lang="en-US" smtClean="0"/>
-              <a:t>11/18/2021</a:t>
+              <a:t>1/13/2022</a:t>
             </a:fld>
             <a:endParaRPr lang="en-US"/>
           </a:p>
@@ -2994,7 +3000,7 @@
           <a:p>
             <a:fld id="{7AD69ED6-91EF-4BD2-AAD0-A993D1FE3A71}" type="datetimeFigureOut">
               <a:rPr lang="en-US" smtClean="0"/>
-              <a:t>11/18/2021</a:t>
+              <a:t>1/13/2022</a:t>
             </a:fld>
             <a:endParaRPr lang="en-US"/>
           </a:p>
@@ -3409,7 +3415,7 @@
           <a:p>
             <a:fld id="{7AD69ED6-91EF-4BD2-AAD0-A993D1FE3A71}" type="datetimeFigureOut">
               <a:rPr lang="en-US" smtClean="0"/>
-              <a:t>11/18/2021</a:t>
+              <a:t>1/13/2022</a:t>
             </a:fld>
             <a:endParaRPr lang="en-US"/>
           </a:p>
@@ -3551,7 +3557,7 @@
           <a:p>
             <a:fld id="{7AD69ED6-91EF-4BD2-AAD0-A993D1FE3A71}" type="datetimeFigureOut">
               <a:rPr lang="en-US" smtClean="0"/>
-              <a:t>11/18/2021</a:t>
+              <a:t>1/13/2022</a:t>
             </a:fld>
             <a:endParaRPr lang="en-US"/>
           </a:p>
@@ -3664,7 +3670,7 @@
           <a:p>
             <a:fld id="{7AD69ED6-91EF-4BD2-AAD0-A993D1FE3A71}" type="datetimeFigureOut">
               <a:rPr lang="en-US" smtClean="0"/>
-              <a:t>11/18/2021</a:t>
+              <a:t>1/13/2022</a:t>
             </a:fld>
             <a:endParaRPr lang="en-US"/>
           </a:p>
@@ -3977,7 +3983,7 @@
           <a:p>
             <a:fld id="{7AD69ED6-91EF-4BD2-AAD0-A993D1FE3A71}" type="datetimeFigureOut">
               <a:rPr lang="en-US" smtClean="0"/>
-              <a:t>11/18/2021</a:t>
+              <a:t>1/13/2022</a:t>
             </a:fld>
             <a:endParaRPr lang="en-US"/>
           </a:p>
@@ -4218,7 +4224,7 @@
           <a:p>
             <a:fld id="{7AD69ED6-91EF-4BD2-AAD0-A993D1FE3A71}" type="datetimeFigureOut">
               <a:rPr lang="en-US" smtClean="0"/>
-              <a:t>11/18/2021</a:t>
+              <a:t>1/13/2022</a:t>
             </a:fld>
             <a:endParaRPr lang="en-US"/>
           </a:p>
@@ -4723,6 +4729,559 @@
       </p:grpSpPr>
       <p:sp>
         <p:nvSpPr>
+          <p:cNvPr id="2" name="Titel 1">
+            <a:extLst>
+              <a:ext uri="{FF2B5EF4-FFF2-40B4-BE49-F238E27FC236}">
+                <a16:creationId xmlns:a16="http://schemas.microsoft.com/office/drawing/2014/main" id="{9223AD79-1A60-4142-934E-9EC379AB1673}"/>
+              </a:ext>
+            </a:extLst>
+          </p:cNvPr>
+          <p:cNvSpPr>
+            <a:spLocks noGrp="1"/>
+          </p:cNvSpPr>
+          <p:nvPr>
+            <p:ph type="title"/>
+          </p:nvPr>
+        </p:nvSpPr>
+        <p:spPr/>
+        <p:txBody>
+          <a:bodyPr/>
+          <a:lstStyle/>
+          <a:p>
+            <a:r>
+              <a:rPr lang="en-US" dirty="0"/>
+              <a:t>Problems: ‘Jitter’ and ‘smearing’</a:t>
+            </a:r>
+          </a:p>
+        </p:txBody>
+      </p:sp>
+      <p:sp>
+        <p:nvSpPr>
+          <p:cNvPr id="5" name="Content Placeholder 4">
+            <a:extLst>
+              <a:ext uri="{FF2B5EF4-FFF2-40B4-BE49-F238E27FC236}">
+                <a16:creationId xmlns:a16="http://schemas.microsoft.com/office/drawing/2014/main" id="{2F4D4489-9DA0-49EE-BDF2-6D598D3EFF99}"/>
+              </a:ext>
+            </a:extLst>
+          </p:cNvPr>
+          <p:cNvSpPr>
+            <a:spLocks noGrp="1"/>
+          </p:cNvSpPr>
+          <p:nvPr>
+            <p:ph idx="1"/>
+          </p:nvPr>
+        </p:nvSpPr>
+        <p:spPr/>
+        <p:txBody>
+          <a:bodyPr/>
+          <a:lstStyle/>
+          <a:p>
+            <a:endParaRPr lang="en-US"/>
+          </a:p>
+        </p:txBody>
+      </p:sp>
+      <p:sp>
+        <p:nvSpPr>
+          <p:cNvPr id="6" name="Content Placeholder 5">
+            <a:extLst>
+              <a:ext uri="{FF2B5EF4-FFF2-40B4-BE49-F238E27FC236}">
+                <a16:creationId xmlns:a16="http://schemas.microsoft.com/office/drawing/2014/main" id="{651A5515-C915-4178-BAE9-EB68C35B9720}"/>
+              </a:ext>
+            </a:extLst>
+          </p:cNvPr>
+          <p:cNvSpPr>
+            <a:spLocks noGrp="1"/>
+          </p:cNvSpPr>
+          <p:nvPr>
+            <p:ph idx="10"/>
+          </p:nvPr>
+        </p:nvSpPr>
+        <p:spPr/>
+        <p:txBody>
+          <a:bodyPr/>
+          <a:lstStyle/>
+          <a:p>
+            <a:endParaRPr lang="en-US"/>
+          </a:p>
+        </p:txBody>
+      </p:sp>
+      <p:sp>
+        <p:nvSpPr>
+          <p:cNvPr id="4" name="Foliennummernplatzhalter 3">
+            <a:extLst>
+              <a:ext uri="{FF2B5EF4-FFF2-40B4-BE49-F238E27FC236}">
+                <a16:creationId xmlns:a16="http://schemas.microsoft.com/office/drawing/2014/main" id="{0FC0269D-9D3B-463E-AF55-E03DE5F8FA08}"/>
+              </a:ext>
+            </a:extLst>
+          </p:cNvPr>
+          <p:cNvSpPr>
+            <a:spLocks noGrp="1"/>
+          </p:cNvSpPr>
+          <p:nvPr>
+            <p:ph type="sldNum" sz="quarter" idx="12"/>
+          </p:nvPr>
+        </p:nvSpPr>
+        <p:spPr/>
+        <p:txBody>
+          <a:bodyPr/>
+          <a:lstStyle/>
+          <a:p>
+            <a:fld id="{9D195BCC-3514-4B1B-9C18-24F3D67EC549}" type="slidenum">
+              <a:rPr lang="de-DE" smtClean="0"/>
+              <a:t>10</a:t>
+            </a:fld>
+            <a:endParaRPr lang="de-DE"/>
+          </a:p>
+        </p:txBody>
+      </p:sp>
+      <p:pic>
+        <p:nvPicPr>
+          <p:cNvPr id="10" name="Grafik 9">
+            <a:extLst>
+              <a:ext uri="{FF2B5EF4-FFF2-40B4-BE49-F238E27FC236}">
+                <a16:creationId xmlns:a16="http://schemas.microsoft.com/office/drawing/2014/main" id="{DC90BB61-6F1E-4BC2-B55E-B8CE1C1A2670}"/>
+              </a:ext>
+            </a:extLst>
+          </p:cNvPr>
+          <p:cNvPicPr>
+            <a:picLocks noChangeAspect="1"/>
+          </p:cNvPicPr>
+          <p:nvPr/>
+        </p:nvPicPr>
+        <p:blipFill>
+          <a:blip r:embed="rId2"/>
+          <a:stretch>
+            <a:fillRect/>
+          </a:stretch>
+        </p:blipFill>
+        <p:spPr>
+          <a:xfrm>
+            <a:off x="29847" y="1894723"/>
+            <a:ext cx="4194821" cy="3355857"/>
+          </a:xfrm>
+          <a:prstGeom prst="rect">
+            <a:avLst/>
+          </a:prstGeom>
+        </p:spPr>
+      </p:pic>
+      <p:pic>
+        <p:nvPicPr>
+          <p:cNvPr id="13" name="Grafik 12">
+            <a:extLst>
+              <a:ext uri="{FF2B5EF4-FFF2-40B4-BE49-F238E27FC236}">
+                <a16:creationId xmlns:a16="http://schemas.microsoft.com/office/drawing/2014/main" id="{2CA7514C-D931-4B0E-A342-9D3C25BEB37D}"/>
+              </a:ext>
+            </a:extLst>
+          </p:cNvPr>
+          <p:cNvPicPr>
+            <a:picLocks noChangeAspect="1"/>
+          </p:cNvPicPr>
+          <p:nvPr/>
+        </p:nvPicPr>
+        <p:blipFill>
+          <a:blip r:embed="rId3"/>
+          <a:stretch>
+            <a:fillRect/>
+          </a:stretch>
+        </p:blipFill>
+        <p:spPr>
+          <a:xfrm>
+            <a:off x="3817173" y="1894723"/>
+            <a:ext cx="4194821" cy="3355857"/>
+          </a:xfrm>
+          <a:prstGeom prst="rect">
+            <a:avLst/>
+          </a:prstGeom>
+        </p:spPr>
+      </p:pic>
+      <p:pic>
+        <p:nvPicPr>
+          <p:cNvPr id="15" name="Grafik 14">
+            <a:extLst>
+              <a:ext uri="{FF2B5EF4-FFF2-40B4-BE49-F238E27FC236}">
+                <a16:creationId xmlns:a16="http://schemas.microsoft.com/office/drawing/2014/main" id="{4F53F571-C74C-4FE8-85E6-58391D2C19C9}"/>
+              </a:ext>
+            </a:extLst>
+          </p:cNvPr>
+          <p:cNvPicPr>
+            <a:picLocks noChangeAspect="1"/>
+          </p:cNvPicPr>
+          <p:nvPr/>
+        </p:nvPicPr>
+        <p:blipFill>
+          <a:blip r:embed="rId4"/>
+          <a:stretch>
+            <a:fillRect/>
+          </a:stretch>
+        </p:blipFill>
+        <p:spPr>
+          <a:xfrm>
+            <a:off x="7844391" y="1894723"/>
+            <a:ext cx="4194823" cy="3355857"/>
+          </a:xfrm>
+          <a:prstGeom prst="rect">
+            <a:avLst/>
+          </a:prstGeom>
+        </p:spPr>
+      </p:pic>
+      <p:sp>
+        <p:nvSpPr>
+          <p:cNvPr id="16" name="Textfeld 15">
+            <a:extLst>
+              <a:ext uri="{FF2B5EF4-FFF2-40B4-BE49-F238E27FC236}">
+                <a16:creationId xmlns:a16="http://schemas.microsoft.com/office/drawing/2014/main" id="{D9F9F74B-CDF5-4928-8780-4B39858D0963}"/>
+              </a:ext>
+            </a:extLst>
+          </p:cNvPr>
+          <p:cNvSpPr txBox="1"/>
+          <p:nvPr/>
+        </p:nvSpPr>
+        <p:spPr>
+          <a:xfrm>
+            <a:off x="1369014" y="1261956"/>
+            <a:ext cx="9091138" cy="830099"/>
+          </a:xfrm>
+          <a:prstGeom prst="rect">
+            <a:avLst/>
+          </a:prstGeom>
+          <a:noFill/>
+          <a:ln>
+            <a:solidFill>
+              <a:schemeClr val="tx1"/>
+            </a:solidFill>
+          </a:ln>
+        </p:spPr>
+        <p:txBody>
+          <a:bodyPr wrap="square" rtlCol="0">
+            <a:spAutoFit/>
+          </a:bodyPr>
+          <a:lstStyle/>
+          <a:p>
+            <a:pPr algn="l"/>
+            <a:r>
+              <a:rPr lang="en-US" sz="2397" b="1" dirty="0"/>
+              <a:t>Smearing</a:t>
+            </a:r>
+            <a:r>
+              <a:rPr lang="en-US" sz="2397" dirty="0"/>
+              <a:t>: Multiple oscillations overlap and smear together vs. a single large oscillation</a:t>
+            </a:r>
+          </a:p>
+        </p:txBody>
+      </p:sp>
+      <p:sp>
+        <p:nvSpPr>
+          <p:cNvPr id="17" name="Textfeld 16">
+            <a:extLst>
+              <a:ext uri="{FF2B5EF4-FFF2-40B4-BE49-F238E27FC236}">
+                <a16:creationId xmlns:a16="http://schemas.microsoft.com/office/drawing/2014/main" id="{E11DD93E-5009-4E05-9F95-8656BC801F6D}"/>
+              </a:ext>
+            </a:extLst>
+          </p:cNvPr>
+          <p:cNvSpPr txBox="1"/>
+          <p:nvPr/>
+        </p:nvSpPr>
+        <p:spPr>
+          <a:xfrm>
+            <a:off x="2935223" y="5407156"/>
+            <a:ext cx="6475378" cy="1200329"/>
+          </a:xfrm>
+          <a:prstGeom prst="rect">
+            <a:avLst/>
+          </a:prstGeom>
+          <a:noFill/>
+          <a:ln>
+            <a:solidFill>
+              <a:schemeClr val="tx1"/>
+            </a:solidFill>
+          </a:ln>
+        </p:spPr>
+        <p:txBody>
+          <a:bodyPr wrap="square" rtlCol="0">
+            <a:spAutoFit/>
+          </a:bodyPr>
+          <a:lstStyle/>
+          <a:p>
+            <a:pPr algn="l"/>
+            <a:r>
+              <a:rPr lang="en-US" dirty="0"/>
+              <a:t>Possibilities in Analysis Pipeline:</a:t>
+            </a:r>
+          </a:p>
+          <a:p>
+            <a:pPr marL="380533" indent="-380533">
+              <a:buFontTx/>
+              <a:buChar char="-"/>
+            </a:pPr>
+            <a:r>
+              <a:rPr lang="en-US" dirty="0"/>
+              <a:t>Major oscillation ( aka largest amplitude oscillation )</a:t>
+            </a:r>
+          </a:p>
+          <a:p>
+            <a:pPr marL="380533" indent="-380533">
+              <a:buFontTx/>
+              <a:buChar char="-"/>
+            </a:pPr>
+            <a:r>
+              <a:rPr lang="en-US" dirty="0"/>
+              <a:t>Median Oscillation</a:t>
+            </a:r>
+          </a:p>
+          <a:p>
+            <a:pPr marL="380533" indent="-380533">
+              <a:buFontTx/>
+              <a:buChar char="-"/>
+            </a:pPr>
+            <a:r>
+              <a:rPr lang="en-US" dirty="0"/>
+              <a:t>Compute Center of Energy</a:t>
+            </a:r>
+          </a:p>
+        </p:txBody>
+      </p:sp>
+      <p:cxnSp>
+        <p:nvCxnSpPr>
+          <p:cNvPr id="18" name="Gerade Verbindung mit Pfeil 17">
+            <a:extLst>
+              <a:ext uri="{FF2B5EF4-FFF2-40B4-BE49-F238E27FC236}">
+                <a16:creationId xmlns:a16="http://schemas.microsoft.com/office/drawing/2014/main" id="{DA09CCC4-9A56-41A0-9A0D-242657F54415}"/>
+              </a:ext>
+            </a:extLst>
+          </p:cNvPr>
+          <p:cNvCxnSpPr>
+            <a:cxnSpLocks/>
+          </p:cNvCxnSpPr>
+          <p:nvPr/>
+        </p:nvCxnSpPr>
+        <p:spPr>
+          <a:xfrm>
+            <a:off x="1876740" y="3167179"/>
+            <a:ext cx="0" cy="479461"/>
+          </a:xfrm>
+          <a:prstGeom prst="straightConnector1">
+            <a:avLst/>
+          </a:prstGeom>
+          <a:ln w="38100">
+            <a:solidFill>
+              <a:schemeClr val="bg2"/>
+            </a:solidFill>
+            <a:tailEnd type="triangle"/>
+          </a:ln>
+        </p:spPr>
+        <p:style>
+          <a:lnRef idx="1">
+            <a:schemeClr val="accent1"/>
+          </a:lnRef>
+          <a:fillRef idx="0">
+            <a:schemeClr val="accent1"/>
+          </a:fillRef>
+          <a:effectRef idx="0">
+            <a:schemeClr val="accent1"/>
+          </a:effectRef>
+          <a:fontRef idx="minor">
+            <a:schemeClr val="tx1"/>
+          </a:fontRef>
+        </p:style>
+      </p:cxnSp>
+      <p:cxnSp>
+        <p:nvCxnSpPr>
+          <p:cNvPr id="22" name="Gerade Verbindung mit Pfeil 21">
+            <a:extLst>
+              <a:ext uri="{FF2B5EF4-FFF2-40B4-BE49-F238E27FC236}">
+                <a16:creationId xmlns:a16="http://schemas.microsoft.com/office/drawing/2014/main" id="{D16C81DD-3306-4CAB-B96E-FEA31A8CEC07}"/>
+              </a:ext>
+            </a:extLst>
+          </p:cNvPr>
+          <p:cNvCxnSpPr>
+            <a:cxnSpLocks/>
+          </p:cNvCxnSpPr>
+          <p:nvPr/>
+        </p:nvCxnSpPr>
+        <p:spPr>
+          <a:xfrm>
+            <a:off x="5520646" y="3045431"/>
+            <a:ext cx="0" cy="479461"/>
+          </a:xfrm>
+          <a:prstGeom prst="straightConnector1">
+            <a:avLst/>
+          </a:prstGeom>
+          <a:ln w="38100">
+            <a:solidFill>
+              <a:schemeClr val="bg2"/>
+            </a:solidFill>
+            <a:tailEnd type="triangle"/>
+          </a:ln>
+        </p:spPr>
+        <p:style>
+          <a:lnRef idx="1">
+            <a:schemeClr val="accent1"/>
+          </a:lnRef>
+          <a:fillRef idx="0">
+            <a:schemeClr val="accent1"/>
+          </a:fillRef>
+          <a:effectRef idx="0">
+            <a:schemeClr val="accent1"/>
+          </a:effectRef>
+          <a:fontRef idx="minor">
+            <a:schemeClr val="tx1"/>
+          </a:fontRef>
+        </p:style>
+      </p:cxnSp>
+      <p:cxnSp>
+        <p:nvCxnSpPr>
+          <p:cNvPr id="23" name="Gerade Verbindung mit Pfeil 22">
+            <a:extLst>
+              <a:ext uri="{FF2B5EF4-FFF2-40B4-BE49-F238E27FC236}">
+                <a16:creationId xmlns:a16="http://schemas.microsoft.com/office/drawing/2014/main" id="{FD7AD0AD-B571-4508-A6C4-78429D9CAD73}"/>
+              </a:ext>
+            </a:extLst>
+          </p:cNvPr>
+          <p:cNvCxnSpPr>
+            <a:cxnSpLocks/>
+          </p:cNvCxnSpPr>
+          <p:nvPr/>
+        </p:nvCxnSpPr>
+        <p:spPr>
+          <a:xfrm>
+            <a:off x="9260445" y="2102725"/>
+            <a:ext cx="0" cy="351135"/>
+          </a:xfrm>
+          <a:prstGeom prst="straightConnector1">
+            <a:avLst/>
+          </a:prstGeom>
+          <a:ln w="38100">
+            <a:solidFill>
+              <a:schemeClr val="bg2"/>
+            </a:solidFill>
+            <a:tailEnd type="triangle"/>
+          </a:ln>
+        </p:spPr>
+        <p:style>
+          <a:lnRef idx="1">
+            <a:schemeClr val="accent1"/>
+          </a:lnRef>
+          <a:fillRef idx="0">
+            <a:schemeClr val="accent1"/>
+          </a:fillRef>
+          <a:effectRef idx="0">
+            <a:schemeClr val="accent1"/>
+          </a:effectRef>
+          <a:fontRef idx="minor">
+            <a:schemeClr val="tx1"/>
+          </a:fontRef>
+        </p:style>
+      </p:cxnSp>
+    </p:spTree>
+    <p:extLst>
+      <p:ext uri="{BB962C8B-B14F-4D97-AF65-F5344CB8AC3E}">
+        <p14:creationId xmlns:p14="http://schemas.microsoft.com/office/powerpoint/2010/main" val="4220017876"/>
+      </p:ext>
+    </p:extLst>
+  </p:cSld>
+  <p:clrMapOvr>
+    <a:masterClrMapping/>
+  </p:clrMapOvr>
+  <p:timing>
+    <p:tnLst>
+      <p:par>
+        <p:cTn id="1" dur="indefinite" restart="never" nodeType="tmRoot">
+          <p:childTnLst>
+            <p:seq concurrent="1" nextAc="seek">
+              <p:cTn id="2" dur="indefinite" nodeType="mainSeq">
+                <p:childTnLst>
+                  <p:par>
+                    <p:cTn id="3" fill="hold">
+                      <p:stCondLst>
+                        <p:cond delay="indefinite"/>
+                      </p:stCondLst>
+                      <p:childTnLst>
+                        <p:par>
+                          <p:cTn id="4" fill="hold">
+                            <p:stCondLst>
+                              <p:cond delay="0"/>
+                            </p:stCondLst>
+                            <p:childTnLst>
+                              <p:par>
+                                <p:cTn id="5" presetID="1" presetClass="entr" presetSubtype="0" fill="hold" grpId="0" nodeType="clickEffect">
+                                  <p:stCondLst>
+                                    <p:cond delay="0"/>
+                                  </p:stCondLst>
+                                  <p:childTnLst>
+                                    <p:set>
+                                      <p:cBhvr>
+                                        <p:cTn id="6" dur="1" fill="hold">
+                                          <p:stCondLst>
+                                            <p:cond delay="0"/>
+                                          </p:stCondLst>
+                                        </p:cTn>
+                                        <p:tgtEl>
+                                          <p:spTgt spid="17"/>
+                                        </p:tgtEl>
+                                        <p:attrNameLst>
+                                          <p:attrName>style.visibility</p:attrName>
+                                        </p:attrNameLst>
+                                      </p:cBhvr>
+                                      <p:to>
+                                        <p:strVal val="visible"/>
+                                      </p:to>
+                                    </p:set>
+                                  </p:childTnLst>
+                                </p:cTn>
+                              </p:par>
+                            </p:childTnLst>
+                          </p:cTn>
+                        </p:par>
+                      </p:childTnLst>
+                    </p:cTn>
+                  </p:par>
+                </p:childTnLst>
+              </p:cTn>
+              <p:prevCondLst>
+                <p:cond evt="onPrev" delay="0">
+                  <p:tgtEl>
+                    <p:sldTgt/>
+                  </p:tgtEl>
+                </p:cond>
+              </p:prevCondLst>
+              <p:nextCondLst>
+                <p:cond evt="onNext" delay="0">
+                  <p:tgtEl>
+                    <p:sldTgt/>
+                  </p:tgtEl>
+                </p:cond>
+              </p:nextCondLst>
+            </p:seq>
+          </p:childTnLst>
+        </p:cTn>
+      </p:par>
+    </p:tnLst>
+    <p:bldLst>
+      <p:bldP spid="17" grpId="0" animBg="1"/>
+    </p:bldLst>
+  </p:timing>
+</p:sld>
+</file>
+
+<file path=ppt/slides/slide11.xml><?xml version="1.0" encoding="utf-8"?>
+<p:sld xmlns:a="http://schemas.openxmlformats.org/drawingml/2006/main" xmlns:r="http://schemas.openxmlformats.org/officeDocument/2006/relationships" xmlns:p="http://schemas.openxmlformats.org/presentationml/2006/main">
+  <p:cSld>
+    <p:spTree>
+      <p:nvGrpSpPr>
+        <p:cNvPr id="1" name=""/>
+        <p:cNvGrpSpPr/>
+        <p:nvPr/>
+      </p:nvGrpSpPr>
+      <p:grpSpPr>
+        <a:xfrm>
+          <a:off x="0" y="0"/>
+          <a:ext cx="0" cy="0"/>
+          <a:chOff x="0" y="0"/>
+          <a:chExt cx="0" cy="0"/>
+        </a:xfrm>
+      </p:grpSpPr>
+      <p:sp>
+        <p:nvSpPr>
           <p:cNvPr id="23" name="Titel 1">
             <a:extLst>
               <a:ext uri="{FF2B5EF4-FFF2-40B4-BE49-F238E27FC236}">
@@ -4824,7 +5383,7 @@
           <a:p>
             <a:fld id="{9D195BCC-3514-4B1B-9C18-24F3D67EC549}" type="slidenum">
               <a:rPr lang="de-DE" smtClean="0"/>
-              <a:t>10</a:t>
+              <a:t>11</a:t>
             </a:fld>
             <a:endParaRPr lang="de-DE"/>
           </a:p>
@@ -5259,7 +5818,7 @@
 </p:sld>
 </file>
 
-<file path=ppt/slides/slide11.xml><?xml version="1.0" encoding="utf-8"?>
+<file path=ppt/slides/slide12.xml><?xml version="1.0" encoding="utf-8"?>
 <p:sld xmlns:a="http://schemas.openxmlformats.org/drawingml/2006/main" xmlns:r="http://schemas.openxmlformats.org/officeDocument/2006/relationships" xmlns:p="http://schemas.openxmlformats.org/presentationml/2006/main">
   <p:cSld>
     <p:spTree>
@@ -5442,7 +6001,7 @@
 </p:sld>
 </file>
 
-<file path=ppt/slides/slide12.xml><?xml version="1.0" encoding="utf-8"?>
+<file path=ppt/slides/slide13.xml><?xml version="1.0" encoding="utf-8"?>
 <p:sld xmlns:a="http://schemas.openxmlformats.org/drawingml/2006/main" xmlns:r="http://schemas.openxmlformats.org/officeDocument/2006/relationships" xmlns:p="http://schemas.openxmlformats.org/presentationml/2006/main">
   <p:cSld>
     <p:spTree>
@@ -9783,10 +10342,10 @@
       </p:grpSpPr>
       <p:sp>
         <p:nvSpPr>
-          <p:cNvPr id="2" name="Titel 1">
-            <a:extLst>
-              <a:ext uri="{FF2B5EF4-FFF2-40B4-BE49-F238E27FC236}">
-                <a16:creationId xmlns:a16="http://schemas.microsoft.com/office/drawing/2014/main" id="{4C52FE01-BD00-46C5-8C25-66086F68138A}"/>
+          <p:cNvPr id="2" name="Title 1">
+            <a:extLst>
+              <a:ext uri="{FF2B5EF4-FFF2-40B4-BE49-F238E27FC236}">
+                <a16:creationId xmlns:a16="http://schemas.microsoft.com/office/drawing/2014/main" id="{B1ABCFF7-8987-450E-A56A-6D5F9B0168A0}"/>
               </a:ext>
             </a:extLst>
           </p:cNvPr>
@@ -9803,6 +10362,161 @@
           <a:lstStyle/>
           <a:p>
             <a:r>
+              <a:rPr lang="en-US" dirty="0"/>
+              <a:t>FOOOF</a:t>
+            </a:r>
+          </a:p>
+        </p:txBody>
+      </p:sp>
+      <p:sp>
+        <p:nvSpPr>
+          <p:cNvPr id="3" name="Content Placeholder 2">
+            <a:extLst>
+              <a:ext uri="{FF2B5EF4-FFF2-40B4-BE49-F238E27FC236}">
+                <a16:creationId xmlns:a16="http://schemas.microsoft.com/office/drawing/2014/main" id="{2F6A63B2-9409-47CE-91BB-CAFAABB7BBE5}"/>
+              </a:ext>
+            </a:extLst>
+          </p:cNvPr>
+          <p:cNvSpPr>
+            <a:spLocks noGrp="1"/>
+          </p:cNvSpPr>
+          <p:nvPr>
+            <p:ph idx="1"/>
+          </p:nvPr>
+        </p:nvSpPr>
+        <p:spPr/>
+        <p:txBody>
+          <a:bodyPr/>
+          <a:lstStyle/>
+          <a:p>
+            <a:endParaRPr lang="en-US"/>
+          </a:p>
+        </p:txBody>
+      </p:sp>
+      <p:sp>
+        <p:nvSpPr>
+          <p:cNvPr id="4" name="Content Placeholder 3">
+            <a:extLst>
+              <a:ext uri="{FF2B5EF4-FFF2-40B4-BE49-F238E27FC236}">
+                <a16:creationId xmlns:a16="http://schemas.microsoft.com/office/drawing/2014/main" id="{18677F73-5271-41EB-8A3F-B5B646FBCF34}"/>
+              </a:ext>
+            </a:extLst>
+          </p:cNvPr>
+          <p:cNvSpPr>
+            <a:spLocks noGrp="1"/>
+          </p:cNvSpPr>
+          <p:nvPr>
+            <p:ph idx="10"/>
+          </p:nvPr>
+        </p:nvSpPr>
+        <p:spPr/>
+        <p:txBody>
+          <a:bodyPr/>
+          <a:lstStyle/>
+          <a:p>
+            <a:endParaRPr lang="en-US"/>
+          </a:p>
+        </p:txBody>
+      </p:sp>
+      <p:pic>
+        <p:nvPicPr>
+          <p:cNvPr id="1026" name="Picture 2" descr="Fig. 2">
+            <a:extLst>
+              <a:ext uri="{FF2B5EF4-FFF2-40B4-BE49-F238E27FC236}">
+                <a16:creationId xmlns:a16="http://schemas.microsoft.com/office/drawing/2014/main" id="{8E4B2592-E265-44A4-95F3-513768375FE0}"/>
+              </a:ext>
+            </a:extLst>
+          </p:cNvPr>
+          <p:cNvPicPr>
+            <a:picLocks noChangeAspect="1" noChangeArrowheads="1"/>
+          </p:cNvPicPr>
+          <p:nvPr/>
+        </p:nvPicPr>
+        <p:blipFill>
+          <a:blip r:embed="rId2">
+            <a:extLst>
+              <a:ext uri="{28A0092B-C50C-407E-A947-70E740481C1C}">
+                <a14:useLocalDpi xmlns:a14="http://schemas.microsoft.com/office/drawing/2010/main" val="0"/>
+              </a:ext>
+            </a:extLst>
+          </a:blip>
+          <a:srcRect/>
+          <a:stretch>
+            <a:fillRect/>
+          </a:stretch>
+        </p:blipFill>
+        <p:spPr bwMode="auto">
+          <a:xfrm>
+            <a:off x="2539999" y="535033"/>
+            <a:ext cx="8521123" cy="5787933"/>
+          </a:xfrm>
+          <a:prstGeom prst="rect">
+            <a:avLst/>
+          </a:prstGeom>
+          <a:noFill/>
+          <a:extLst>
+            <a:ext uri="{909E8E84-426E-40DD-AFC4-6F175D3DCCD1}">
+              <a14:hiddenFill xmlns:a14="http://schemas.microsoft.com/office/drawing/2010/main">
+                <a:solidFill>
+                  <a:srgbClr val="FFFFFF"/>
+                </a:solidFill>
+              </a14:hiddenFill>
+            </a:ext>
+          </a:extLst>
+        </p:spPr>
+      </p:pic>
+    </p:spTree>
+    <p:extLst>
+      <p:ext uri="{BB962C8B-B14F-4D97-AF65-F5344CB8AC3E}">
+        <p14:creationId xmlns:p14="http://schemas.microsoft.com/office/powerpoint/2010/main" val="1279393878"/>
+      </p:ext>
+    </p:extLst>
+  </p:cSld>
+  <p:clrMapOvr>
+    <a:masterClrMapping/>
+  </p:clrMapOvr>
+</p:sld>
+</file>
+
+<file path=ppt/slides/slide8.xml><?xml version="1.0" encoding="utf-8"?>
+<p:sld xmlns:a="http://schemas.openxmlformats.org/drawingml/2006/main" xmlns:r="http://schemas.openxmlformats.org/officeDocument/2006/relationships" xmlns:p="http://schemas.openxmlformats.org/presentationml/2006/main">
+  <p:cSld>
+    <p:spTree>
+      <p:nvGrpSpPr>
+        <p:cNvPr id="1" name=""/>
+        <p:cNvGrpSpPr/>
+        <p:nvPr/>
+      </p:nvGrpSpPr>
+      <p:grpSpPr>
+        <a:xfrm>
+          <a:off x="0" y="0"/>
+          <a:ext cx="0" cy="0"/>
+          <a:chOff x="0" y="0"/>
+          <a:chExt cx="0" cy="0"/>
+        </a:xfrm>
+      </p:grpSpPr>
+      <p:sp>
+        <p:nvSpPr>
+          <p:cNvPr id="2" name="Titel 1">
+            <a:extLst>
+              <a:ext uri="{FF2B5EF4-FFF2-40B4-BE49-F238E27FC236}">
+                <a16:creationId xmlns:a16="http://schemas.microsoft.com/office/drawing/2014/main" id="{4C52FE01-BD00-46C5-8C25-66086F68138A}"/>
+              </a:ext>
+            </a:extLst>
+          </p:cNvPr>
+          <p:cNvSpPr>
+            <a:spLocks noGrp="1"/>
+          </p:cNvSpPr>
+          <p:nvPr>
+            <p:ph type="title"/>
+          </p:nvPr>
+        </p:nvSpPr>
+        <p:spPr/>
+        <p:txBody>
+          <a:bodyPr/>
+          <a:lstStyle/>
+          <a:p>
+            <a:r>
               <a:rPr lang="en-US" dirty="0" err="1"/>
               <a:t>Fooof</a:t>
             </a:r>
@@ -9869,7 +10583,7 @@
           <a:p>
             <a:fld id="{9D195BCC-3514-4B1B-9C18-24F3D67EC549}" type="slidenum">
               <a:rPr lang="de-DE" smtClean="0"/>
-              <a:t>7</a:t>
+              <a:t>8</a:t>
             </a:fld>
             <a:endParaRPr lang="de-DE"/>
           </a:p>
@@ -10123,7 +10837,7 @@
 </p:sld>
 </file>
 
-<file path=ppt/slides/slide8.xml><?xml version="1.0" encoding="utf-8"?>
+<file path=ppt/slides/slide9.xml><?xml version="1.0" encoding="utf-8"?>
 <p:sld xmlns:a="http://schemas.openxmlformats.org/drawingml/2006/main" xmlns:r="http://schemas.openxmlformats.org/officeDocument/2006/relationships" xmlns:p="http://schemas.openxmlformats.org/presentationml/2006/main">
   <p:cSld>
     <p:spTree>
@@ -10228,7 +10942,7 @@
           <a:p>
             <a:fld id="{9D195BCC-3514-4B1B-9C18-24F3D67EC549}" type="slidenum">
               <a:rPr lang="de-DE" smtClean="0"/>
-              <a:t>8</a:t>
+              <a:t>9</a:t>
             </a:fld>
             <a:endParaRPr lang="de-DE"/>
           </a:p>
@@ -10438,559 +11152,6 @@
         </p:cTn>
       </p:par>
     </p:tnLst>
-  </p:timing>
-</p:sld>
-</file>
-
-<file path=ppt/slides/slide9.xml><?xml version="1.0" encoding="utf-8"?>
-<p:sld xmlns:a="http://schemas.openxmlformats.org/drawingml/2006/main" xmlns:r="http://schemas.openxmlformats.org/officeDocument/2006/relationships" xmlns:p="http://schemas.openxmlformats.org/presentationml/2006/main">
-  <p:cSld>
-    <p:spTree>
-      <p:nvGrpSpPr>
-        <p:cNvPr id="1" name=""/>
-        <p:cNvGrpSpPr/>
-        <p:nvPr/>
-      </p:nvGrpSpPr>
-      <p:grpSpPr>
-        <a:xfrm>
-          <a:off x="0" y="0"/>
-          <a:ext cx="0" cy="0"/>
-          <a:chOff x="0" y="0"/>
-          <a:chExt cx="0" cy="0"/>
-        </a:xfrm>
-      </p:grpSpPr>
-      <p:sp>
-        <p:nvSpPr>
-          <p:cNvPr id="2" name="Titel 1">
-            <a:extLst>
-              <a:ext uri="{FF2B5EF4-FFF2-40B4-BE49-F238E27FC236}">
-                <a16:creationId xmlns:a16="http://schemas.microsoft.com/office/drawing/2014/main" id="{9223AD79-1A60-4142-934E-9EC379AB1673}"/>
-              </a:ext>
-            </a:extLst>
-          </p:cNvPr>
-          <p:cNvSpPr>
-            <a:spLocks noGrp="1"/>
-          </p:cNvSpPr>
-          <p:nvPr>
-            <p:ph type="title"/>
-          </p:nvPr>
-        </p:nvSpPr>
-        <p:spPr/>
-        <p:txBody>
-          <a:bodyPr/>
-          <a:lstStyle/>
-          <a:p>
-            <a:r>
-              <a:rPr lang="en-US" dirty="0"/>
-              <a:t>Problems: ‘Jitter’ and ‘smearing’</a:t>
-            </a:r>
-          </a:p>
-        </p:txBody>
-      </p:sp>
-      <p:sp>
-        <p:nvSpPr>
-          <p:cNvPr id="5" name="Content Placeholder 4">
-            <a:extLst>
-              <a:ext uri="{FF2B5EF4-FFF2-40B4-BE49-F238E27FC236}">
-                <a16:creationId xmlns:a16="http://schemas.microsoft.com/office/drawing/2014/main" id="{2F4D4489-9DA0-49EE-BDF2-6D598D3EFF99}"/>
-              </a:ext>
-            </a:extLst>
-          </p:cNvPr>
-          <p:cNvSpPr>
-            <a:spLocks noGrp="1"/>
-          </p:cNvSpPr>
-          <p:nvPr>
-            <p:ph idx="1"/>
-          </p:nvPr>
-        </p:nvSpPr>
-        <p:spPr/>
-        <p:txBody>
-          <a:bodyPr/>
-          <a:lstStyle/>
-          <a:p>
-            <a:endParaRPr lang="en-US"/>
-          </a:p>
-        </p:txBody>
-      </p:sp>
-      <p:sp>
-        <p:nvSpPr>
-          <p:cNvPr id="6" name="Content Placeholder 5">
-            <a:extLst>
-              <a:ext uri="{FF2B5EF4-FFF2-40B4-BE49-F238E27FC236}">
-                <a16:creationId xmlns:a16="http://schemas.microsoft.com/office/drawing/2014/main" id="{651A5515-C915-4178-BAE9-EB68C35B9720}"/>
-              </a:ext>
-            </a:extLst>
-          </p:cNvPr>
-          <p:cNvSpPr>
-            <a:spLocks noGrp="1"/>
-          </p:cNvSpPr>
-          <p:nvPr>
-            <p:ph idx="10"/>
-          </p:nvPr>
-        </p:nvSpPr>
-        <p:spPr/>
-        <p:txBody>
-          <a:bodyPr/>
-          <a:lstStyle/>
-          <a:p>
-            <a:endParaRPr lang="en-US"/>
-          </a:p>
-        </p:txBody>
-      </p:sp>
-      <p:sp>
-        <p:nvSpPr>
-          <p:cNvPr id="4" name="Foliennummernplatzhalter 3">
-            <a:extLst>
-              <a:ext uri="{FF2B5EF4-FFF2-40B4-BE49-F238E27FC236}">
-                <a16:creationId xmlns:a16="http://schemas.microsoft.com/office/drawing/2014/main" id="{0FC0269D-9D3B-463E-AF55-E03DE5F8FA08}"/>
-              </a:ext>
-            </a:extLst>
-          </p:cNvPr>
-          <p:cNvSpPr>
-            <a:spLocks noGrp="1"/>
-          </p:cNvSpPr>
-          <p:nvPr>
-            <p:ph type="sldNum" sz="quarter" idx="12"/>
-          </p:nvPr>
-        </p:nvSpPr>
-        <p:spPr/>
-        <p:txBody>
-          <a:bodyPr/>
-          <a:lstStyle/>
-          <a:p>
-            <a:fld id="{9D195BCC-3514-4B1B-9C18-24F3D67EC549}" type="slidenum">
-              <a:rPr lang="de-DE" smtClean="0"/>
-              <a:t>9</a:t>
-            </a:fld>
-            <a:endParaRPr lang="de-DE"/>
-          </a:p>
-        </p:txBody>
-      </p:sp>
-      <p:pic>
-        <p:nvPicPr>
-          <p:cNvPr id="10" name="Grafik 9">
-            <a:extLst>
-              <a:ext uri="{FF2B5EF4-FFF2-40B4-BE49-F238E27FC236}">
-                <a16:creationId xmlns:a16="http://schemas.microsoft.com/office/drawing/2014/main" id="{DC90BB61-6F1E-4BC2-B55E-B8CE1C1A2670}"/>
-              </a:ext>
-            </a:extLst>
-          </p:cNvPr>
-          <p:cNvPicPr>
-            <a:picLocks noChangeAspect="1"/>
-          </p:cNvPicPr>
-          <p:nvPr/>
-        </p:nvPicPr>
-        <p:blipFill>
-          <a:blip r:embed="rId2"/>
-          <a:stretch>
-            <a:fillRect/>
-          </a:stretch>
-        </p:blipFill>
-        <p:spPr>
-          <a:xfrm>
-            <a:off x="29847" y="1894723"/>
-            <a:ext cx="4194821" cy="3355857"/>
-          </a:xfrm>
-          <a:prstGeom prst="rect">
-            <a:avLst/>
-          </a:prstGeom>
-        </p:spPr>
-      </p:pic>
-      <p:pic>
-        <p:nvPicPr>
-          <p:cNvPr id="13" name="Grafik 12">
-            <a:extLst>
-              <a:ext uri="{FF2B5EF4-FFF2-40B4-BE49-F238E27FC236}">
-                <a16:creationId xmlns:a16="http://schemas.microsoft.com/office/drawing/2014/main" id="{2CA7514C-D931-4B0E-A342-9D3C25BEB37D}"/>
-              </a:ext>
-            </a:extLst>
-          </p:cNvPr>
-          <p:cNvPicPr>
-            <a:picLocks noChangeAspect="1"/>
-          </p:cNvPicPr>
-          <p:nvPr/>
-        </p:nvPicPr>
-        <p:blipFill>
-          <a:blip r:embed="rId3"/>
-          <a:stretch>
-            <a:fillRect/>
-          </a:stretch>
-        </p:blipFill>
-        <p:spPr>
-          <a:xfrm>
-            <a:off x="3817173" y="1894723"/>
-            <a:ext cx="4194821" cy="3355857"/>
-          </a:xfrm>
-          <a:prstGeom prst="rect">
-            <a:avLst/>
-          </a:prstGeom>
-        </p:spPr>
-      </p:pic>
-      <p:pic>
-        <p:nvPicPr>
-          <p:cNvPr id="15" name="Grafik 14">
-            <a:extLst>
-              <a:ext uri="{FF2B5EF4-FFF2-40B4-BE49-F238E27FC236}">
-                <a16:creationId xmlns:a16="http://schemas.microsoft.com/office/drawing/2014/main" id="{4F53F571-C74C-4FE8-85E6-58391D2C19C9}"/>
-              </a:ext>
-            </a:extLst>
-          </p:cNvPr>
-          <p:cNvPicPr>
-            <a:picLocks noChangeAspect="1"/>
-          </p:cNvPicPr>
-          <p:nvPr/>
-        </p:nvPicPr>
-        <p:blipFill>
-          <a:blip r:embed="rId4"/>
-          <a:stretch>
-            <a:fillRect/>
-          </a:stretch>
-        </p:blipFill>
-        <p:spPr>
-          <a:xfrm>
-            <a:off x="7844391" y="1894723"/>
-            <a:ext cx="4194823" cy="3355857"/>
-          </a:xfrm>
-          <a:prstGeom prst="rect">
-            <a:avLst/>
-          </a:prstGeom>
-        </p:spPr>
-      </p:pic>
-      <p:sp>
-        <p:nvSpPr>
-          <p:cNvPr id="16" name="Textfeld 15">
-            <a:extLst>
-              <a:ext uri="{FF2B5EF4-FFF2-40B4-BE49-F238E27FC236}">
-                <a16:creationId xmlns:a16="http://schemas.microsoft.com/office/drawing/2014/main" id="{D9F9F74B-CDF5-4928-8780-4B39858D0963}"/>
-              </a:ext>
-            </a:extLst>
-          </p:cNvPr>
-          <p:cNvSpPr txBox="1"/>
-          <p:nvPr/>
-        </p:nvSpPr>
-        <p:spPr>
-          <a:xfrm>
-            <a:off x="1369014" y="1261956"/>
-            <a:ext cx="9091138" cy="830099"/>
-          </a:xfrm>
-          <a:prstGeom prst="rect">
-            <a:avLst/>
-          </a:prstGeom>
-          <a:noFill/>
-          <a:ln>
-            <a:solidFill>
-              <a:schemeClr val="tx1"/>
-            </a:solidFill>
-          </a:ln>
-        </p:spPr>
-        <p:txBody>
-          <a:bodyPr wrap="square" rtlCol="0">
-            <a:spAutoFit/>
-          </a:bodyPr>
-          <a:lstStyle/>
-          <a:p>
-            <a:pPr algn="l"/>
-            <a:r>
-              <a:rPr lang="en-US" sz="2397" b="1" dirty="0"/>
-              <a:t>Smearing</a:t>
-            </a:r>
-            <a:r>
-              <a:rPr lang="en-US" sz="2397" dirty="0"/>
-              <a:t>: Multiple oscillations overlap and smear together vs. a single large oscillation</a:t>
-            </a:r>
-          </a:p>
-        </p:txBody>
-      </p:sp>
-      <p:sp>
-        <p:nvSpPr>
-          <p:cNvPr id="17" name="Textfeld 16">
-            <a:extLst>
-              <a:ext uri="{FF2B5EF4-FFF2-40B4-BE49-F238E27FC236}">
-                <a16:creationId xmlns:a16="http://schemas.microsoft.com/office/drawing/2014/main" id="{E11DD93E-5009-4E05-9F95-8656BC801F6D}"/>
-              </a:ext>
-            </a:extLst>
-          </p:cNvPr>
-          <p:cNvSpPr txBox="1"/>
-          <p:nvPr/>
-        </p:nvSpPr>
-        <p:spPr>
-          <a:xfrm>
-            <a:off x="2935223" y="5407156"/>
-            <a:ext cx="6475378" cy="1200329"/>
-          </a:xfrm>
-          <a:prstGeom prst="rect">
-            <a:avLst/>
-          </a:prstGeom>
-          <a:noFill/>
-          <a:ln>
-            <a:solidFill>
-              <a:schemeClr val="tx1"/>
-            </a:solidFill>
-          </a:ln>
-        </p:spPr>
-        <p:txBody>
-          <a:bodyPr wrap="square" rtlCol="0">
-            <a:spAutoFit/>
-          </a:bodyPr>
-          <a:lstStyle/>
-          <a:p>
-            <a:pPr algn="l"/>
-            <a:r>
-              <a:rPr lang="en-US" dirty="0"/>
-              <a:t>Possibilities in Analysis Pipeline:</a:t>
-            </a:r>
-          </a:p>
-          <a:p>
-            <a:pPr marL="380533" indent="-380533">
-              <a:buFontTx/>
-              <a:buChar char="-"/>
-            </a:pPr>
-            <a:r>
-              <a:rPr lang="en-US" dirty="0"/>
-              <a:t>Major oscillation ( aka largest amplitude oscillation )</a:t>
-            </a:r>
-          </a:p>
-          <a:p>
-            <a:pPr marL="380533" indent="-380533">
-              <a:buFontTx/>
-              <a:buChar char="-"/>
-            </a:pPr>
-            <a:r>
-              <a:rPr lang="en-US" dirty="0"/>
-              <a:t>Median Oscillation</a:t>
-            </a:r>
-          </a:p>
-          <a:p>
-            <a:pPr marL="380533" indent="-380533">
-              <a:buFontTx/>
-              <a:buChar char="-"/>
-            </a:pPr>
-            <a:r>
-              <a:rPr lang="en-US" dirty="0"/>
-              <a:t>Compute Center of Energy</a:t>
-            </a:r>
-          </a:p>
-        </p:txBody>
-      </p:sp>
-      <p:cxnSp>
-        <p:nvCxnSpPr>
-          <p:cNvPr id="18" name="Gerade Verbindung mit Pfeil 17">
-            <a:extLst>
-              <a:ext uri="{FF2B5EF4-FFF2-40B4-BE49-F238E27FC236}">
-                <a16:creationId xmlns:a16="http://schemas.microsoft.com/office/drawing/2014/main" id="{DA09CCC4-9A56-41A0-9A0D-242657F54415}"/>
-              </a:ext>
-            </a:extLst>
-          </p:cNvPr>
-          <p:cNvCxnSpPr>
-            <a:cxnSpLocks/>
-          </p:cNvCxnSpPr>
-          <p:nvPr/>
-        </p:nvCxnSpPr>
-        <p:spPr>
-          <a:xfrm>
-            <a:off x="1876740" y="3167179"/>
-            <a:ext cx="0" cy="479461"/>
-          </a:xfrm>
-          <a:prstGeom prst="straightConnector1">
-            <a:avLst/>
-          </a:prstGeom>
-          <a:ln w="38100">
-            <a:solidFill>
-              <a:schemeClr val="bg2"/>
-            </a:solidFill>
-            <a:tailEnd type="triangle"/>
-          </a:ln>
-        </p:spPr>
-        <p:style>
-          <a:lnRef idx="1">
-            <a:schemeClr val="accent1"/>
-          </a:lnRef>
-          <a:fillRef idx="0">
-            <a:schemeClr val="accent1"/>
-          </a:fillRef>
-          <a:effectRef idx="0">
-            <a:schemeClr val="accent1"/>
-          </a:effectRef>
-          <a:fontRef idx="minor">
-            <a:schemeClr val="tx1"/>
-          </a:fontRef>
-        </p:style>
-      </p:cxnSp>
-      <p:cxnSp>
-        <p:nvCxnSpPr>
-          <p:cNvPr id="22" name="Gerade Verbindung mit Pfeil 21">
-            <a:extLst>
-              <a:ext uri="{FF2B5EF4-FFF2-40B4-BE49-F238E27FC236}">
-                <a16:creationId xmlns:a16="http://schemas.microsoft.com/office/drawing/2014/main" id="{D16C81DD-3306-4CAB-B96E-FEA31A8CEC07}"/>
-              </a:ext>
-            </a:extLst>
-          </p:cNvPr>
-          <p:cNvCxnSpPr>
-            <a:cxnSpLocks/>
-          </p:cNvCxnSpPr>
-          <p:nvPr/>
-        </p:nvCxnSpPr>
-        <p:spPr>
-          <a:xfrm>
-            <a:off x="5520646" y="3045431"/>
-            <a:ext cx="0" cy="479461"/>
-          </a:xfrm>
-          <a:prstGeom prst="straightConnector1">
-            <a:avLst/>
-          </a:prstGeom>
-          <a:ln w="38100">
-            <a:solidFill>
-              <a:schemeClr val="bg2"/>
-            </a:solidFill>
-            <a:tailEnd type="triangle"/>
-          </a:ln>
-        </p:spPr>
-        <p:style>
-          <a:lnRef idx="1">
-            <a:schemeClr val="accent1"/>
-          </a:lnRef>
-          <a:fillRef idx="0">
-            <a:schemeClr val="accent1"/>
-          </a:fillRef>
-          <a:effectRef idx="0">
-            <a:schemeClr val="accent1"/>
-          </a:effectRef>
-          <a:fontRef idx="minor">
-            <a:schemeClr val="tx1"/>
-          </a:fontRef>
-        </p:style>
-      </p:cxnSp>
-      <p:cxnSp>
-        <p:nvCxnSpPr>
-          <p:cNvPr id="23" name="Gerade Verbindung mit Pfeil 22">
-            <a:extLst>
-              <a:ext uri="{FF2B5EF4-FFF2-40B4-BE49-F238E27FC236}">
-                <a16:creationId xmlns:a16="http://schemas.microsoft.com/office/drawing/2014/main" id="{FD7AD0AD-B571-4508-A6C4-78429D9CAD73}"/>
-              </a:ext>
-            </a:extLst>
-          </p:cNvPr>
-          <p:cNvCxnSpPr>
-            <a:cxnSpLocks/>
-          </p:cNvCxnSpPr>
-          <p:nvPr/>
-        </p:nvCxnSpPr>
-        <p:spPr>
-          <a:xfrm>
-            <a:off x="9260445" y="2102725"/>
-            <a:ext cx="0" cy="351135"/>
-          </a:xfrm>
-          <a:prstGeom prst="straightConnector1">
-            <a:avLst/>
-          </a:prstGeom>
-          <a:ln w="38100">
-            <a:solidFill>
-              <a:schemeClr val="bg2"/>
-            </a:solidFill>
-            <a:tailEnd type="triangle"/>
-          </a:ln>
-        </p:spPr>
-        <p:style>
-          <a:lnRef idx="1">
-            <a:schemeClr val="accent1"/>
-          </a:lnRef>
-          <a:fillRef idx="0">
-            <a:schemeClr val="accent1"/>
-          </a:fillRef>
-          <a:effectRef idx="0">
-            <a:schemeClr val="accent1"/>
-          </a:effectRef>
-          <a:fontRef idx="minor">
-            <a:schemeClr val="tx1"/>
-          </a:fontRef>
-        </p:style>
-      </p:cxnSp>
-    </p:spTree>
-    <p:extLst>
-      <p:ext uri="{BB962C8B-B14F-4D97-AF65-F5344CB8AC3E}">
-        <p14:creationId xmlns:p14="http://schemas.microsoft.com/office/powerpoint/2010/main" val="4220017876"/>
-      </p:ext>
-    </p:extLst>
-  </p:cSld>
-  <p:clrMapOvr>
-    <a:masterClrMapping/>
-  </p:clrMapOvr>
-  <p:timing>
-    <p:tnLst>
-      <p:par>
-        <p:cTn id="1" dur="indefinite" restart="never" nodeType="tmRoot">
-          <p:childTnLst>
-            <p:seq concurrent="1" nextAc="seek">
-              <p:cTn id="2" dur="indefinite" nodeType="mainSeq">
-                <p:childTnLst>
-                  <p:par>
-                    <p:cTn id="3" fill="hold">
-                      <p:stCondLst>
-                        <p:cond delay="indefinite"/>
-                      </p:stCondLst>
-                      <p:childTnLst>
-                        <p:par>
-                          <p:cTn id="4" fill="hold">
-                            <p:stCondLst>
-                              <p:cond delay="0"/>
-                            </p:stCondLst>
-                            <p:childTnLst>
-                              <p:par>
-                                <p:cTn id="5" presetID="1" presetClass="entr" presetSubtype="0" fill="hold" grpId="0" nodeType="clickEffect">
-                                  <p:stCondLst>
-                                    <p:cond delay="0"/>
-                                  </p:stCondLst>
-                                  <p:childTnLst>
-                                    <p:set>
-                                      <p:cBhvr>
-                                        <p:cTn id="6" dur="1" fill="hold">
-                                          <p:stCondLst>
-                                            <p:cond delay="0"/>
-                                          </p:stCondLst>
-                                        </p:cTn>
-                                        <p:tgtEl>
-                                          <p:spTgt spid="17"/>
-                                        </p:tgtEl>
-                                        <p:attrNameLst>
-                                          <p:attrName>style.visibility</p:attrName>
-                                        </p:attrNameLst>
-                                      </p:cBhvr>
-                                      <p:to>
-                                        <p:strVal val="visible"/>
-                                      </p:to>
-                                    </p:set>
-                                  </p:childTnLst>
-                                </p:cTn>
-                              </p:par>
-                            </p:childTnLst>
-                          </p:cTn>
-                        </p:par>
-                      </p:childTnLst>
-                    </p:cTn>
-                  </p:par>
-                </p:childTnLst>
-              </p:cTn>
-              <p:prevCondLst>
-                <p:cond evt="onPrev" delay="0">
-                  <p:tgtEl>
-                    <p:sldTgt/>
-                  </p:tgtEl>
-                </p:cond>
-              </p:prevCondLst>
-              <p:nextCondLst>
-                <p:cond evt="onNext" delay="0">
-                  <p:tgtEl>
-                    <p:sldTgt/>
-                  </p:tgtEl>
-                </p:cond>
-              </p:nextCondLst>
-            </p:seq>
-          </p:childTnLst>
-        </p:cTn>
-      </p:par>
-    </p:tnLst>
-    <p:bldLst>
-      <p:bldP spid="17" grpId="0" animBg="1"/>
-    </p:bldLst>
   </p:timing>
 </p:sld>
 </file>

</xml_diff>